<commit_message>
Created tentative IEEE Cluster 2024 logo. again.
</commit_message>
<xml_diff>
--- a/assets/img/logo_cluster24.pptx
+++ b/assets/img/logo_cluster24.pptx
@@ -2987,8 +2987,8 @@
         </p:nvSpPr>
         <p:spPr>
           <a:xfrm>
-            <a:off x="1791181" y="121876"/>
-            <a:ext cx="6001540" cy="1585049"/>
+            <a:off x="1791181" y="62938"/>
+            <a:ext cx="6001540" cy="1731243"/>
           </a:xfrm>
           <a:prstGeom prst="rect">
             <a:avLst/>
@@ -2996,7 +2996,7 @@
           <a:noFill/>
         </p:spPr>
         <p:txBody>
-          <a:bodyPr wrap="square" rtlCol="0">
+          <a:bodyPr wrap="square" rtlCol="0" anchor="ctr">
             <a:spAutoFit/>
           </a:bodyPr>
           <a:lstStyle/>
@@ -3007,7 +3007,10 @@
               </a:lnSpc>
             </a:pPr>
             <a:r>
-              <a:rPr lang="en-US" sz="3200" b="1" dirty="0"/>
+              <a:rPr lang="en-US" sz="4400" b="1" dirty="0">
+                <a:latin typeface="Arial Narrow" panose="020B0606020202030204" pitchFamily="34" charset="0"/>
+                <a:cs typeface="Arial" panose="020B0604020202020204" pitchFamily="34" charset="0"/>
+              </a:rPr>
               <a:t>IEEE</a:t>
             </a:r>
           </a:p>
@@ -3018,29 +3021,48 @@
               </a:lnSpc>
             </a:pPr>
             <a:r>
-              <a:rPr lang="en-US" sz="6000" b="1" dirty="0"/>
+              <a:rPr lang="en-US" sz="6600" b="1" dirty="0">
+                <a:latin typeface="Arial Narrow" panose="020B0606020202030204" pitchFamily="34" charset="0"/>
+                <a:cs typeface="Arial" panose="020B0604020202020204" pitchFamily="34" charset="0"/>
+              </a:rPr>
               <a:t>CLUSTER</a:t>
             </a:r>
             <a:r>
-              <a:rPr lang="en-US" sz="4400" dirty="0"/>
+              <a:rPr lang="en-US" sz="4800" dirty="0">
+                <a:latin typeface="Arial Narrow" panose="020B0606020202030204" pitchFamily="34" charset="0"/>
+                <a:cs typeface="Arial" panose="020B0604020202020204" pitchFamily="34" charset="0"/>
+              </a:rPr>
               <a:t> </a:t>
             </a:r>
             <a:r>
-              <a:rPr lang="en-US" sz="6000" dirty="0"/>
+              <a:rPr lang="en-US" sz="6600" dirty="0">
+                <a:latin typeface="Arial Narrow" panose="020B0606020202030204" pitchFamily="34" charset="0"/>
+                <a:cs typeface="Arial" panose="020B0604020202020204" pitchFamily="34" charset="0"/>
+              </a:rPr>
               <a:t>2024</a:t>
             </a:r>
-          </a:p>
-          <a:p>
-            <a:r>
-              <a:rPr lang="en-US" sz="2800" dirty="0"/>
-              <a:t>Kobe, Japan     September 24</a:t>
-            </a:r>
-            <a:r>
-              <a:rPr lang="en-US" altLang="ja-JP" sz="2800" dirty="0"/>
+            <a:endParaRPr lang="en-US" sz="6000" dirty="0">
+              <a:latin typeface="Arial Narrow" panose="020B0606020202030204" pitchFamily="34" charset="0"/>
+              <a:cs typeface="Arial" panose="020B0604020202020204" pitchFamily="34" charset="0"/>
+            </a:endParaRPr>
+          </a:p>
+          <a:p>
+            <a:r>
+              <a:rPr lang="en-US" sz="2400" dirty="0">
+                <a:cs typeface="Arial" panose="020B0604020202020204" pitchFamily="34" charset="0"/>
+              </a:rPr>
+              <a:t>Kobe, Japan      September 24</a:t>
+            </a:r>
+            <a:r>
+              <a:rPr lang="en-US" altLang="ja-JP" sz="2400" dirty="0">
+                <a:cs typeface="Arial" panose="020B0604020202020204" pitchFamily="34" charset="0"/>
+              </a:rPr>
               <a:t>–27, </a:t>
             </a:r>
             <a:r>
-              <a:rPr lang="en-US" sz="2800" dirty="0"/>
+              <a:rPr lang="en-US" sz="2400" dirty="0">
+                <a:cs typeface="Arial" panose="020B0604020202020204" pitchFamily="34" charset="0"/>
+              </a:rPr>
               <a:t>2024</a:t>
             </a:r>
           </a:p>
@@ -3060,7 +3082,7 @@
         </p:nvSpPr>
         <p:spPr>
           <a:xfrm>
-            <a:off x="56147" y="92242"/>
+            <a:off x="56147" y="106401"/>
             <a:ext cx="1644316" cy="1644316"/>
           </a:xfrm>
           <a:prstGeom prst="ellipse">

</xml_diff>